<commit_message>
added he knows my name
</commit_message>
<xml_diff>
--- a/docs/songs_2024-09-29.pptx
+++ b/docs/songs_2024-09-29.pptx
@@ -5,7 +5,7 @@
     <p:sldMasterId id="2147483648" r:id="rId1"/>
   </p:sldMasterIdLst>
   <p:notesMasterIdLst>
-    <p:notesMasterId r:id="rId41"/>
+    <p:notesMasterId r:id="rId46"/>
   </p:notesMasterIdLst>
   <p:sldIdLst>
     <p:sldId id="950" r:id="rId2"/>
@@ -46,7 +46,12 @@
     <p:sldId id="1171" r:id="rId37"/>
     <p:sldId id="1243" r:id="rId38"/>
     <p:sldId id="1122" r:id="rId39"/>
-    <p:sldId id="946" r:id="rId40"/>
+    <p:sldId id="642" r:id="rId40"/>
+    <p:sldId id="607" r:id="rId41"/>
+    <p:sldId id="643" r:id="rId42"/>
+    <p:sldId id="644" r:id="rId43"/>
+    <p:sldId id="645" r:id="rId44"/>
+    <p:sldId id="946" r:id="rId45"/>
   </p:sldIdLst>
   <p:sldSz cx="9144000" cy="6858000" type="screen4x3"/>
   <p:notesSz cx="6858000" cy="9144000"/>
@@ -188,6 +193,11 @@
             <p14:sldId id="1171"/>
             <p14:sldId id="1243"/>
             <p14:sldId id="1122"/>
+            <p14:sldId id="642"/>
+            <p14:sldId id="607"/>
+            <p14:sldId id="643"/>
+            <p14:sldId id="644"/>
+            <p14:sldId id="645"/>
             <p14:sldId id="946"/>
           </p14:sldIdLst>
         </p14:section>
@@ -1190,7 +1200,7 @@
           <a:p>
             <a:fld id="{E79B61DE-1D46-4752-AF65-FA2C4EB0D1D0}" type="slidenum">
               <a:rPr lang="en-GB" smtClean="0"/>
-              <a:t>39</a:t>
+              <a:t>44</a:t>
             </a:fld>
             <a:endParaRPr lang="en-GB"/>
           </a:p>
@@ -10864,438 +10874,122 @@
       </p:grpSpPr>
       <p:sp>
         <p:nvSpPr>
-          <p:cNvPr id="2" name="Title 1">
-            <a:extLst>
-              <a:ext uri="{FF2B5EF4-FFF2-40B4-BE49-F238E27FC236}">
-                <a16:creationId xmlns:a16="http://schemas.microsoft.com/office/drawing/2014/main" id="{8D906D2A-5E68-F15C-89E4-2DBC4F4793A3}"/>
-              </a:ext>
-            </a:extLst>
-          </p:cNvPr>
-          <p:cNvSpPr txBox="1">
-            <a:spLocks/>
-          </p:cNvSpPr>
-          <p:nvPr/>
-        </p:nvSpPr>
-        <p:spPr bwMode="auto">
+          <p:cNvPr id="3" name="Subtitle 2"/>
+          <p:cNvSpPr>
+            <a:spLocks noGrp="1"/>
+          </p:cNvSpPr>
+          <p:nvPr>
+            <p:ph type="subTitle" idx="1"/>
+          </p:nvPr>
+        </p:nvSpPr>
+        <p:spPr>
           <a:xfrm>
-            <a:off x="457200" y="836712"/>
-            <a:ext cx="8229600" cy="489346"/>
+            <a:off x="323528" y="188640"/>
+            <a:ext cx="8640960" cy="6480720"/>
           </a:xfrm>
-          <a:prstGeom prst="rect">
-            <a:avLst/>
-          </a:prstGeom>
-          <a:noFill/>
-          <a:ln>
-            <a:noFill/>
-          </a:ln>
-          <a:extLst>
-            <a:ext uri="{909E8E84-426E-40DD-AFC4-6F175D3DCCD1}">
-              <a14:hiddenFill xmlns:a14="http://schemas.microsoft.com/office/drawing/2010/main">
-                <a:solidFill>
-                  <a:srgbClr val="FFFFFF"/>
-                </a:solidFill>
-              </a14:hiddenFill>
-            </a:ext>
-            <a:ext uri="{91240B29-F687-4F45-9708-019B960494DF}">
-              <a14:hiddenLine xmlns:a14="http://schemas.microsoft.com/office/drawing/2010/main" w="9525">
-                <a:solidFill>
-                  <a:srgbClr val="000000"/>
-                </a:solidFill>
-                <a:miter lim="800000"/>
-                <a:headEnd/>
-                <a:tailEnd/>
-              </a14:hiddenLine>
-            </a:ext>
-          </a:extLst>
         </p:spPr>
         <p:txBody>
-          <a:bodyPr vert="horz" wrap="square" lIns="91440" tIns="45720" rIns="91440" bIns="45720" numCol="1" anchor="ctr" anchorCtr="0" compatLnSpc="1">
-            <a:prstTxWarp prst="textNoShape">
-              <a:avLst/>
-            </a:prstTxWarp>
-            <a:normAutofit fontScale="90000" lnSpcReduction="10000"/>
+          <a:bodyPr>
+            <a:noAutofit/>
           </a:bodyPr>
-          <a:lstStyle>
-            <a:lvl1pPr algn="l" defTabSz="457200" rtl="0" eaLnBrk="1" fontAlgn="base" hangingPunct="1">
-              <a:spcBef>
-                <a:spcPct val="0"/>
-              </a:spcBef>
-              <a:spcAft>
-                <a:spcPct val="0"/>
-              </a:spcAft>
-              <a:defRPr sz="3200" kern="1200">
-                <a:solidFill>
-                  <a:srgbClr val="58595B"/>
-                </a:solidFill>
-                <a:latin typeface="Rockwell"/>
-                <a:ea typeface="+mj-ea"/>
-                <a:cs typeface="+mj-cs"/>
-              </a:defRPr>
-            </a:lvl1pPr>
-            <a:lvl2pPr algn="l" defTabSz="457200" rtl="0" eaLnBrk="1" fontAlgn="base" hangingPunct="1">
-              <a:spcBef>
-                <a:spcPct val="0"/>
-              </a:spcBef>
-              <a:spcAft>
-                <a:spcPct val="0"/>
-              </a:spcAft>
-              <a:defRPr sz="4400">
-                <a:solidFill>
-                  <a:srgbClr val="58595B"/>
-                </a:solidFill>
-                <a:latin typeface="Rockwell" panose="02060603020205020403" pitchFamily="18" charset="0"/>
-              </a:defRPr>
-            </a:lvl2pPr>
-            <a:lvl3pPr algn="l" defTabSz="457200" rtl="0" eaLnBrk="1" fontAlgn="base" hangingPunct="1">
-              <a:spcBef>
-                <a:spcPct val="0"/>
-              </a:spcBef>
-              <a:spcAft>
-                <a:spcPct val="0"/>
-              </a:spcAft>
-              <a:defRPr sz="4400">
-                <a:solidFill>
-                  <a:srgbClr val="58595B"/>
-                </a:solidFill>
-                <a:latin typeface="Rockwell" panose="02060603020205020403" pitchFamily="18" charset="0"/>
-              </a:defRPr>
-            </a:lvl3pPr>
-            <a:lvl4pPr algn="l" defTabSz="457200" rtl="0" eaLnBrk="1" fontAlgn="base" hangingPunct="1">
-              <a:spcBef>
-                <a:spcPct val="0"/>
-              </a:spcBef>
-              <a:spcAft>
-                <a:spcPct val="0"/>
-              </a:spcAft>
-              <a:defRPr sz="4400">
-                <a:solidFill>
-                  <a:srgbClr val="58595B"/>
-                </a:solidFill>
-                <a:latin typeface="Rockwell" panose="02060603020205020403" pitchFamily="18" charset="0"/>
-              </a:defRPr>
-            </a:lvl4pPr>
-            <a:lvl5pPr algn="l" defTabSz="457200" rtl="0" eaLnBrk="1" fontAlgn="base" hangingPunct="1">
-              <a:spcBef>
-                <a:spcPct val="0"/>
-              </a:spcBef>
-              <a:spcAft>
-                <a:spcPct val="0"/>
-              </a:spcAft>
-              <a:defRPr sz="4400">
-                <a:solidFill>
-                  <a:srgbClr val="58595B"/>
-                </a:solidFill>
-                <a:latin typeface="Rockwell" panose="02060603020205020403" pitchFamily="18" charset="0"/>
-              </a:defRPr>
-            </a:lvl5pPr>
-            <a:lvl6pPr marL="457200" algn="l" defTabSz="457200" rtl="0" eaLnBrk="1" fontAlgn="base" hangingPunct="1">
-              <a:spcBef>
-                <a:spcPct val="0"/>
-              </a:spcBef>
-              <a:spcAft>
-                <a:spcPct val="0"/>
-              </a:spcAft>
-              <a:defRPr sz="4400">
-                <a:solidFill>
-                  <a:srgbClr val="58595B"/>
-                </a:solidFill>
-                <a:latin typeface="Rockwell" panose="02060603020205020403" pitchFamily="18" charset="0"/>
-              </a:defRPr>
-            </a:lvl6pPr>
-            <a:lvl7pPr marL="914400" algn="l" defTabSz="457200" rtl="0" eaLnBrk="1" fontAlgn="base" hangingPunct="1">
-              <a:spcBef>
-                <a:spcPct val="0"/>
-              </a:spcBef>
-              <a:spcAft>
-                <a:spcPct val="0"/>
-              </a:spcAft>
-              <a:defRPr sz="4400">
-                <a:solidFill>
-                  <a:srgbClr val="58595B"/>
-                </a:solidFill>
-                <a:latin typeface="Rockwell" panose="02060603020205020403" pitchFamily="18" charset="0"/>
-              </a:defRPr>
-            </a:lvl7pPr>
-            <a:lvl8pPr marL="1371600" algn="l" defTabSz="457200" rtl="0" eaLnBrk="1" fontAlgn="base" hangingPunct="1">
-              <a:spcBef>
-                <a:spcPct val="0"/>
-              </a:spcBef>
-              <a:spcAft>
-                <a:spcPct val="0"/>
-              </a:spcAft>
-              <a:defRPr sz="4400">
-                <a:solidFill>
-                  <a:srgbClr val="58595B"/>
-                </a:solidFill>
-                <a:latin typeface="Rockwell" panose="02060603020205020403" pitchFamily="18" charset="0"/>
-              </a:defRPr>
-            </a:lvl8pPr>
-            <a:lvl9pPr marL="1828800" algn="l" defTabSz="457200" rtl="0" eaLnBrk="1" fontAlgn="base" hangingPunct="1">
-              <a:spcBef>
-                <a:spcPct val="0"/>
-              </a:spcBef>
-              <a:spcAft>
-                <a:spcPct val="0"/>
-              </a:spcAft>
-              <a:defRPr sz="4400">
-                <a:solidFill>
-                  <a:srgbClr val="58595B"/>
-                </a:solidFill>
-                <a:latin typeface="Rockwell" panose="02060603020205020403" pitchFamily="18" charset="0"/>
-              </a:defRPr>
-            </a:lvl9pPr>
-          </a:lstStyle>
-          <a:p>
-            <a:pPr marL="0" marR="0" lvl="0" indent="0" algn="l" defTabSz="457200" rtl="0" eaLnBrk="1" fontAlgn="base" latinLnBrk="0" hangingPunct="1">
-              <a:lnSpc>
-                <a:spcPct val="100000"/>
-              </a:lnSpc>
-              <a:spcBef>
-                <a:spcPct val="0"/>
-              </a:spcBef>
-              <a:spcAft>
-                <a:spcPct val="0"/>
-              </a:spcAft>
-              <a:buClrTx/>
-              <a:buSzTx/>
-              <a:buFontTx/>
-              <a:buNone/>
-              <a:tabLst/>
-              <a:defRPr/>
-            </a:pPr>
-            <a:endParaRPr kumimoji="0" lang="en-GB" sz="3200" b="0" i="0" u="none" strike="noStrike" kern="1200" cap="none" spc="0" normalizeH="0" baseline="0" noProof="0" dirty="0">
-              <a:ln>
-                <a:noFill/>
-              </a:ln>
+          <a:lstStyle/>
+          <a:p>
+            <a:endParaRPr lang="en-GB" sz="6600" dirty="0">
               <a:solidFill>
-                <a:schemeClr val="bg1"/>
+                <a:srgbClr val="00A3E0"/>
               </a:solidFill>
-              <a:effectLst/>
-              <a:uLnTx/>
-              <a:uFillTx/>
-              <a:latin typeface="Rockwell"/>
-              <a:ea typeface="+mj-ea"/>
-              <a:cs typeface="+mj-cs"/>
+              <a:latin typeface="akagi_probook"/>
             </a:endParaRPr>
           </a:p>
-        </p:txBody>
-      </p:sp>
-      <p:sp>
-        <p:nvSpPr>
-          <p:cNvPr id="4" name="Title 1">
-            <a:extLst>
-              <a:ext uri="{FF2B5EF4-FFF2-40B4-BE49-F238E27FC236}">
-                <a16:creationId xmlns:a16="http://schemas.microsoft.com/office/drawing/2014/main" id="{89C6AC8B-4AF1-9B45-6683-F14ED4AE0E1F}"/>
-              </a:ext>
-            </a:extLst>
-          </p:cNvPr>
-          <p:cNvSpPr txBox="1">
-            <a:spLocks/>
-          </p:cNvSpPr>
-          <p:nvPr/>
-        </p:nvSpPr>
-        <p:spPr bwMode="auto">
-          <a:xfrm>
-            <a:off x="323528" y="116632"/>
-            <a:ext cx="8229600" cy="4680520"/>
-          </a:xfrm>
-          <a:prstGeom prst="rect">
-            <a:avLst/>
-          </a:prstGeom>
-          <a:noFill/>
-          <a:ln>
-            <a:noFill/>
-          </a:ln>
-          <a:extLst>
-            <a:ext uri="{909E8E84-426E-40DD-AFC4-6F175D3DCCD1}">
-              <a14:hiddenFill xmlns:a14="http://schemas.microsoft.com/office/drawing/2010/main">
-                <a:solidFill>
-                  <a:srgbClr val="FFFFFF"/>
-                </a:solidFill>
-              </a14:hiddenFill>
-            </a:ext>
-            <a:ext uri="{91240B29-F687-4F45-9708-019B960494DF}">
-              <a14:hiddenLine xmlns:a14="http://schemas.microsoft.com/office/drawing/2010/main" w="9525">
-                <a:solidFill>
-                  <a:srgbClr val="000000"/>
-                </a:solidFill>
-                <a:miter lim="800000"/>
-                <a:headEnd/>
-                <a:tailEnd/>
-              </a14:hiddenLine>
-            </a:ext>
-          </a:extLst>
-        </p:spPr>
-        <p:txBody>
-          <a:bodyPr vert="horz" wrap="square" lIns="91440" tIns="45720" rIns="91440" bIns="45720" numCol="1" anchor="ctr" anchorCtr="0" compatLnSpc="1">
-            <a:prstTxWarp prst="textNoShape">
-              <a:avLst/>
-            </a:prstTxWarp>
-            <a:normAutofit/>
-          </a:bodyPr>
-          <a:lstStyle>
-            <a:lvl1pPr algn="l" defTabSz="457200" rtl="0" eaLnBrk="1" fontAlgn="base" hangingPunct="1">
-              <a:spcBef>
-                <a:spcPct val="0"/>
-              </a:spcBef>
-              <a:spcAft>
-                <a:spcPct val="0"/>
-              </a:spcAft>
-              <a:defRPr sz="3200" kern="1200">
-                <a:solidFill>
-                  <a:srgbClr val="58595B"/>
-                </a:solidFill>
-                <a:latin typeface="Rockwell"/>
-                <a:ea typeface="+mj-ea"/>
-                <a:cs typeface="+mj-cs"/>
-              </a:defRPr>
-            </a:lvl1pPr>
-            <a:lvl2pPr algn="l" defTabSz="457200" rtl="0" eaLnBrk="1" fontAlgn="base" hangingPunct="1">
-              <a:spcBef>
-                <a:spcPct val="0"/>
-              </a:spcBef>
-              <a:spcAft>
-                <a:spcPct val="0"/>
-              </a:spcAft>
-              <a:defRPr sz="4400">
-                <a:solidFill>
-                  <a:srgbClr val="58595B"/>
-                </a:solidFill>
-                <a:latin typeface="Rockwell" panose="02060603020205020403" pitchFamily="18" charset="0"/>
-              </a:defRPr>
-            </a:lvl2pPr>
-            <a:lvl3pPr algn="l" defTabSz="457200" rtl="0" eaLnBrk="1" fontAlgn="base" hangingPunct="1">
-              <a:spcBef>
-                <a:spcPct val="0"/>
-              </a:spcBef>
-              <a:spcAft>
-                <a:spcPct val="0"/>
-              </a:spcAft>
-              <a:defRPr sz="4400">
-                <a:solidFill>
-                  <a:srgbClr val="58595B"/>
-                </a:solidFill>
-                <a:latin typeface="Rockwell" panose="02060603020205020403" pitchFamily="18" charset="0"/>
-              </a:defRPr>
-            </a:lvl3pPr>
-            <a:lvl4pPr algn="l" defTabSz="457200" rtl="0" eaLnBrk="1" fontAlgn="base" hangingPunct="1">
-              <a:spcBef>
-                <a:spcPct val="0"/>
-              </a:spcBef>
-              <a:spcAft>
-                <a:spcPct val="0"/>
-              </a:spcAft>
-              <a:defRPr sz="4400">
-                <a:solidFill>
-                  <a:srgbClr val="58595B"/>
-                </a:solidFill>
-                <a:latin typeface="Rockwell" panose="02060603020205020403" pitchFamily="18" charset="0"/>
-              </a:defRPr>
-            </a:lvl4pPr>
-            <a:lvl5pPr algn="l" defTabSz="457200" rtl="0" eaLnBrk="1" fontAlgn="base" hangingPunct="1">
-              <a:spcBef>
-                <a:spcPct val="0"/>
-              </a:spcBef>
-              <a:spcAft>
-                <a:spcPct val="0"/>
-              </a:spcAft>
-              <a:defRPr sz="4400">
-                <a:solidFill>
-                  <a:srgbClr val="58595B"/>
-                </a:solidFill>
-                <a:latin typeface="Rockwell" panose="02060603020205020403" pitchFamily="18" charset="0"/>
-              </a:defRPr>
-            </a:lvl5pPr>
-            <a:lvl6pPr marL="457200" algn="l" defTabSz="457200" rtl="0" eaLnBrk="1" fontAlgn="base" hangingPunct="1">
-              <a:spcBef>
-                <a:spcPct val="0"/>
-              </a:spcBef>
-              <a:spcAft>
-                <a:spcPct val="0"/>
-              </a:spcAft>
-              <a:defRPr sz="4400">
-                <a:solidFill>
-                  <a:srgbClr val="58595B"/>
-                </a:solidFill>
-                <a:latin typeface="Rockwell" panose="02060603020205020403" pitchFamily="18" charset="0"/>
-              </a:defRPr>
-            </a:lvl6pPr>
-            <a:lvl7pPr marL="914400" algn="l" defTabSz="457200" rtl="0" eaLnBrk="1" fontAlgn="base" hangingPunct="1">
-              <a:spcBef>
-                <a:spcPct val="0"/>
-              </a:spcBef>
-              <a:spcAft>
-                <a:spcPct val="0"/>
-              </a:spcAft>
-              <a:defRPr sz="4400">
-                <a:solidFill>
-                  <a:srgbClr val="58595B"/>
-                </a:solidFill>
-                <a:latin typeface="Rockwell" panose="02060603020205020403" pitchFamily="18" charset="0"/>
-              </a:defRPr>
-            </a:lvl7pPr>
-            <a:lvl8pPr marL="1371600" algn="l" defTabSz="457200" rtl="0" eaLnBrk="1" fontAlgn="base" hangingPunct="1">
-              <a:spcBef>
-                <a:spcPct val="0"/>
-              </a:spcBef>
-              <a:spcAft>
-                <a:spcPct val="0"/>
-              </a:spcAft>
-              <a:defRPr sz="4400">
-                <a:solidFill>
-                  <a:srgbClr val="58595B"/>
-                </a:solidFill>
-                <a:latin typeface="Rockwell" panose="02060603020205020403" pitchFamily="18" charset="0"/>
-              </a:defRPr>
-            </a:lvl8pPr>
-            <a:lvl9pPr marL="1828800" algn="l" defTabSz="457200" rtl="0" eaLnBrk="1" fontAlgn="base" hangingPunct="1">
-              <a:spcBef>
-                <a:spcPct val="0"/>
-              </a:spcBef>
-              <a:spcAft>
-                <a:spcPct val="0"/>
-              </a:spcAft>
-              <a:defRPr sz="4400">
-                <a:solidFill>
-                  <a:srgbClr val="58595B"/>
-                </a:solidFill>
-                <a:latin typeface="Rockwell" panose="02060603020205020403" pitchFamily="18" charset="0"/>
-              </a:defRPr>
-            </a:lvl9pPr>
-          </a:lstStyle>
-          <a:p>
-            <a:pPr lvl="0" algn="ctr">
-              <a:defRPr/>
-            </a:pPr>
-            <a:r>
-              <a:rPr lang="en-GB" dirty="0">
-                <a:solidFill>
-                  <a:schemeClr val="bg1"/>
-                </a:solidFill>
-              </a:rPr>
-              <a:t>2 Corinthians 14</a:t>
-            </a:r>
+          <a:p>
+            <a:r>
+              <a:rPr lang="en-GB" sz="6600" dirty="0">
+                <a:solidFill>
+                  <a:srgbClr val="00A3E0"/>
+                </a:solidFill>
+                <a:latin typeface="akagi_probook"/>
+              </a:rPr>
+              <a:t>He Knows My Name</a:t>
+            </a:r>
+          </a:p>
+          <a:p>
             <a:br>
-              <a:rPr lang="en-GB" dirty="0">
+              <a:rPr lang="en-GB" sz="1200" dirty="0">
                 <a:solidFill>
                   <a:schemeClr val="bg1"/>
                 </a:solidFill>
               </a:rPr>
             </a:br>
             <a:br>
-              <a:rPr lang="en-GB" dirty="0">
+              <a:rPr lang="en-GB" sz="1200" dirty="0">
                 <a:solidFill>
                   <a:schemeClr val="bg1"/>
                 </a:solidFill>
               </a:rPr>
             </a:br>
             <a:r>
-              <a:rPr lang="en-GB" dirty="0">
-                <a:solidFill>
-                  <a:schemeClr val="bg1"/>
-                </a:solidFill>
-              </a:rPr>
-              <a:t>May the grace of the Lord Jesus Christ, and the love of God, and the fellowship of the Holy Spirit be with you all</a:t>
+              <a:rPr lang="en-GB" sz="1200" dirty="0">
+                <a:solidFill>
+                  <a:schemeClr val="bg1"/>
+                </a:solidFill>
+              </a:rPr>
+              <a:t>CCLI Song # 2151368</a:t>
+            </a:r>
+          </a:p>
+          <a:p>
+            <a:r>
+              <a:rPr lang="en-GB" sz="1200" dirty="0">
+                <a:solidFill>
+                  <a:schemeClr val="bg1"/>
+                </a:solidFill>
+              </a:rPr>
+              <a:t>Tommy Walker</a:t>
+            </a:r>
+          </a:p>
+          <a:p>
+            <a:r>
+              <a:rPr lang="en-GB" sz="1200" dirty="0">
+                <a:solidFill>
+                  <a:schemeClr val="bg1"/>
+                </a:solidFill>
+              </a:rPr>
+              <a:t>© 1996 Universal Music - Brentwood Benson Songs</a:t>
+            </a:r>
+          </a:p>
+          <a:p>
+            <a:r>
+              <a:rPr lang="en-GB" sz="1200" dirty="0">
+                <a:solidFill>
+                  <a:schemeClr val="bg1"/>
+                </a:solidFill>
+              </a:rPr>
+              <a:t>For use solely with the </a:t>
+            </a:r>
+            <a:r>
+              <a:rPr lang="en-GB" sz="1200" dirty="0" err="1">
+                <a:solidFill>
+                  <a:schemeClr val="bg1"/>
+                </a:solidFill>
+              </a:rPr>
+              <a:t>SongSelect</a:t>
+            </a:r>
+            <a:r>
+              <a:rPr lang="en-GB" sz="1200" dirty="0">
+                <a:solidFill>
+                  <a:schemeClr val="bg1"/>
+                </a:solidFill>
+              </a:rPr>
+              <a:t>® Terms of Use. All rights reserved. www.ccli.com</a:t>
+            </a:r>
+          </a:p>
+          <a:p>
+            <a:r>
+              <a:rPr lang="en-GB" sz="1200" dirty="0">
+                <a:solidFill>
+                  <a:schemeClr val="bg1"/>
+                </a:solidFill>
+              </a:rPr>
+              <a:t>CCLI Licence No. 33265</a:t>
             </a:r>
           </a:p>
         </p:txBody>
@@ -11303,7 +10997,7 @@
     </p:spTree>
     <p:extLst>
       <p:ext uri="{BB962C8B-B14F-4D97-AF65-F5344CB8AC3E}">
-        <p14:creationId xmlns:p14="http://schemas.microsoft.com/office/powerpoint/2010/main" val="3974712765"/>
+        <p14:creationId xmlns:p14="http://schemas.microsoft.com/office/powerpoint/2010/main" val="3614559884"/>
       </p:ext>
     </p:extLst>
   </p:cSld>
@@ -11486,6 +11180,978 @@
     <p:extLst>
       <p:ext uri="{BB962C8B-B14F-4D97-AF65-F5344CB8AC3E}">
         <p14:creationId xmlns:p14="http://schemas.microsoft.com/office/powerpoint/2010/main" val="2903591331"/>
+      </p:ext>
+    </p:extLst>
+  </p:cSld>
+  <p:clrMapOvr>
+    <a:masterClrMapping/>
+  </p:clrMapOvr>
+</p:sld>
+</file>
+
+<file path=ppt/slides/slide40.xml><?xml version="1.0" encoding="utf-8"?>
+<p:sld xmlns:a="http://schemas.openxmlformats.org/drawingml/2006/main" xmlns:r="http://schemas.openxmlformats.org/officeDocument/2006/relationships" xmlns:p="http://schemas.openxmlformats.org/presentationml/2006/main">
+  <p:cSld>
+    <p:spTree>
+      <p:nvGrpSpPr>
+        <p:cNvPr id="1" name=""/>
+        <p:cNvGrpSpPr/>
+        <p:nvPr/>
+      </p:nvGrpSpPr>
+      <p:grpSpPr>
+        <a:xfrm>
+          <a:off x="0" y="0"/>
+          <a:ext cx="0" cy="0"/>
+          <a:chOff x="0" y="0"/>
+          <a:chExt cx="0" cy="0"/>
+        </a:xfrm>
+      </p:grpSpPr>
+      <p:sp>
+        <p:nvSpPr>
+          <p:cNvPr id="3" name="Subtitle 2"/>
+          <p:cNvSpPr>
+            <a:spLocks noGrp="1"/>
+          </p:cNvSpPr>
+          <p:nvPr>
+            <p:ph type="subTitle" idx="1"/>
+          </p:nvPr>
+        </p:nvSpPr>
+        <p:spPr>
+          <a:xfrm>
+            <a:off x="203118" y="692696"/>
+            <a:ext cx="8640960" cy="6480720"/>
+          </a:xfrm>
+        </p:spPr>
+        <p:txBody>
+          <a:bodyPr>
+            <a:noAutofit/>
+          </a:bodyPr>
+          <a:lstStyle/>
+          <a:p>
+            <a:r>
+              <a:rPr lang="en-GB" sz="3600" dirty="0">
+                <a:solidFill>
+                  <a:schemeClr val="bg1"/>
+                </a:solidFill>
+              </a:rPr>
+              <a:t>I have a Maker</a:t>
+            </a:r>
+          </a:p>
+          <a:p>
+            <a:r>
+              <a:rPr lang="en-GB" sz="3600" dirty="0">
+                <a:solidFill>
+                  <a:schemeClr val="bg1"/>
+                </a:solidFill>
+              </a:rPr>
+              <a:t>He formed my heart</a:t>
+            </a:r>
+          </a:p>
+          <a:p>
+            <a:r>
+              <a:rPr lang="en-GB" sz="3600" dirty="0">
+                <a:solidFill>
+                  <a:schemeClr val="bg1"/>
+                </a:solidFill>
+              </a:rPr>
+              <a:t>Before even time began</a:t>
+            </a:r>
+          </a:p>
+          <a:p>
+            <a:r>
+              <a:rPr lang="en-GB" sz="3600" dirty="0">
+                <a:solidFill>
+                  <a:schemeClr val="bg1"/>
+                </a:solidFill>
+              </a:rPr>
+              <a:t>My life was in His hand</a:t>
+            </a:r>
+          </a:p>
+        </p:txBody>
+      </p:sp>
+      <p:sp>
+        <p:nvSpPr>
+          <p:cNvPr id="4" name="TextBox 3"/>
+          <p:cNvSpPr txBox="1"/>
+          <p:nvPr/>
+        </p:nvSpPr>
+        <p:spPr>
+          <a:xfrm>
+            <a:off x="8529729" y="0"/>
+            <a:ext cx="628698" cy="461665"/>
+          </a:xfrm>
+          <a:prstGeom prst="rect">
+            <a:avLst/>
+          </a:prstGeom>
+          <a:noFill/>
+        </p:spPr>
+        <p:txBody>
+          <a:bodyPr wrap="none" rtlCol="0">
+            <a:spAutoFit/>
+          </a:bodyPr>
+          <a:lstStyle/>
+          <a:p>
+            <a:r>
+              <a:rPr lang="en-GB" sz="2400" b="1" dirty="0">
+                <a:solidFill>
+                  <a:schemeClr val="bg1"/>
+                </a:solidFill>
+              </a:rPr>
+              <a:t>1/4</a:t>
+            </a:r>
+          </a:p>
+        </p:txBody>
+      </p:sp>
+    </p:spTree>
+    <p:extLst>
+      <p:ext uri="{BB962C8B-B14F-4D97-AF65-F5344CB8AC3E}">
+        <p14:creationId xmlns:p14="http://schemas.microsoft.com/office/powerpoint/2010/main" val="856293209"/>
+      </p:ext>
+    </p:extLst>
+  </p:cSld>
+  <p:clrMapOvr>
+    <a:masterClrMapping/>
+  </p:clrMapOvr>
+</p:sld>
+</file>
+
+<file path=ppt/slides/slide41.xml><?xml version="1.0" encoding="utf-8"?>
+<p:sld xmlns:a="http://schemas.openxmlformats.org/drawingml/2006/main" xmlns:r="http://schemas.openxmlformats.org/officeDocument/2006/relationships" xmlns:p="http://schemas.openxmlformats.org/presentationml/2006/main">
+  <p:cSld>
+    <p:spTree>
+      <p:nvGrpSpPr>
+        <p:cNvPr id="1" name=""/>
+        <p:cNvGrpSpPr/>
+        <p:nvPr/>
+      </p:nvGrpSpPr>
+      <p:grpSpPr>
+        <a:xfrm>
+          <a:off x="0" y="0"/>
+          <a:ext cx="0" cy="0"/>
+          <a:chOff x="0" y="0"/>
+          <a:chExt cx="0" cy="0"/>
+        </a:xfrm>
+      </p:grpSpPr>
+      <p:sp>
+        <p:nvSpPr>
+          <p:cNvPr id="3" name="Subtitle 2"/>
+          <p:cNvSpPr>
+            <a:spLocks noGrp="1"/>
+          </p:cNvSpPr>
+          <p:nvPr>
+            <p:ph type="subTitle" idx="1"/>
+          </p:nvPr>
+        </p:nvSpPr>
+        <p:spPr>
+          <a:xfrm>
+            <a:off x="203118" y="692696"/>
+            <a:ext cx="8640960" cy="6480720"/>
+          </a:xfrm>
+        </p:spPr>
+        <p:txBody>
+          <a:bodyPr>
+            <a:noAutofit/>
+          </a:bodyPr>
+          <a:lstStyle/>
+          <a:p>
+            <a:r>
+              <a:rPr lang="en-GB" sz="3600" dirty="0">
+                <a:solidFill>
+                  <a:schemeClr val="bg1"/>
+                </a:solidFill>
+              </a:rPr>
+              <a:t>He knows my name</a:t>
+            </a:r>
+          </a:p>
+          <a:p>
+            <a:r>
+              <a:rPr lang="en-GB" sz="3600" dirty="0">
+                <a:solidFill>
+                  <a:schemeClr val="bg1"/>
+                </a:solidFill>
+              </a:rPr>
+              <a:t>He knows my every thought</a:t>
+            </a:r>
+          </a:p>
+          <a:p>
+            <a:r>
+              <a:rPr lang="en-GB" sz="3600" dirty="0">
+                <a:solidFill>
+                  <a:schemeClr val="bg1"/>
+                </a:solidFill>
+              </a:rPr>
+              <a:t>He sees each tear that falls</a:t>
+            </a:r>
+          </a:p>
+          <a:p>
+            <a:r>
+              <a:rPr lang="en-GB" sz="3600" dirty="0">
+                <a:solidFill>
+                  <a:schemeClr val="bg1"/>
+                </a:solidFill>
+              </a:rPr>
+              <a:t>And hears me when I call</a:t>
+            </a:r>
+          </a:p>
+        </p:txBody>
+      </p:sp>
+      <p:sp>
+        <p:nvSpPr>
+          <p:cNvPr id="4" name="TextBox 3"/>
+          <p:cNvSpPr txBox="1"/>
+          <p:nvPr/>
+        </p:nvSpPr>
+        <p:spPr>
+          <a:xfrm>
+            <a:off x="8529729" y="0"/>
+            <a:ext cx="628698" cy="461665"/>
+          </a:xfrm>
+          <a:prstGeom prst="rect">
+            <a:avLst/>
+          </a:prstGeom>
+          <a:noFill/>
+        </p:spPr>
+        <p:txBody>
+          <a:bodyPr wrap="none" rtlCol="0">
+            <a:spAutoFit/>
+          </a:bodyPr>
+          <a:lstStyle/>
+          <a:p>
+            <a:r>
+              <a:rPr lang="en-GB" sz="2400" b="1" dirty="0">
+                <a:solidFill>
+                  <a:schemeClr val="bg1"/>
+                </a:solidFill>
+              </a:rPr>
+              <a:t>2/4</a:t>
+            </a:r>
+          </a:p>
+        </p:txBody>
+      </p:sp>
+    </p:spTree>
+    <p:extLst>
+      <p:ext uri="{BB962C8B-B14F-4D97-AF65-F5344CB8AC3E}">
+        <p14:creationId xmlns:p14="http://schemas.microsoft.com/office/powerpoint/2010/main" val="4143099939"/>
+      </p:ext>
+    </p:extLst>
+  </p:cSld>
+  <p:clrMapOvr>
+    <a:masterClrMapping/>
+  </p:clrMapOvr>
+</p:sld>
+</file>
+
+<file path=ppt/slides/slide42.xml><?xml version="1.0" encoding="utf-8"?>
+<p:sld xmlns:a="http://schemas.openxmlformats.org/drawingml/2006/main" xmlns:r="http://schemas.openxmlformats.org/officeDocument/2006/relationships" xmlns:p="http://schemas.openxmlformats.org/presentationml/2006/main">
+  <p:cSld>
+    <p:spTree>
+      <p:nvGrpSpPr>
+        <p:cNvPr id="1" name=""/>
+        <p:cNvGrpSpPr/>
+        <p:nvPr/>
+      </p:nvGrpSpPr>
+      <p:grpSpPr>
+        <a:xfrm>
+          <a:off x="0" y="0"/>
+          <a:ext cx="0" cy="0"/>
+          <a:chOff x="0" y="0"/>
+          <a:chExt cx="0" cy="0"/>
+        </a:xfrm>
+      </p:grpSpPr>
+      <p:sp>
+        <p:nvSpPr>
+          <p:cNvPr id="3" name="Subtitle 2"/>
+          <p:cNvSpPr>
+            <a:spLocks noGrp="1"/>
+          </p:cNvSpPr>
+          <p:nvPr>
+            <p:ph type="subTitle" idx="1"/>
+          </p:nvPr>
+        </p:nvSpPr>
+        <p:spPr>
+          <a:xfrm>
+            <a:off x="203118" y="692696"/>
+            <a:ext cx="8640960" cy="6480720"/>
+          </a:xfrm>
+        </p:spPr>
+        <p:txBody>
+          <a:bodyPr>
+            <a:noAutofit/>
+          </a:bodyPr>
+          <a:lstStyle/>
+          <a:p>
+            <a:r>
+              <a:rPr lang="en-GB" sz="3600" dirty="0">
+                <a:solidFill>
+                  <a:schemeClr val="bg1"/>
+                </a:solidFill>
+              </a:rPr>
+              <a:t>I have a Father</a:t>
+            </a:r>
+          </a:p>
+          <a:p>
+            <a:r>
+              <a:rPr lang="en-GB" sz="3600" dirty="0">
+                <a:solidFill>
+                  <a:schemeClr val="bg1"/>
+                </a:solidFill>
+              </a:rPr>
+              <a:t>He calls me His own</a:t>
+            </a:r>
+          </a:p>
+          <a:p>
+            <a:r>
+              <a:rPr lang="en-GB" sz="3600" dirty="0">
+                <a:solidFill>
+                  <a:schemeClr val="bg1"/>
+                </a:solidFill>
+              </a:rPr>
+              <a:t>He'll never leave me</a:t>
+            </a:r>
+          </a:p>
+          <a:p>
+            <a:r>
+              <a:rPr lang="en-GB" sz="3600" dirty="0">
+                <a:solidFill>
+                  <a:schemeClr val="bg1"/>
+                </a:solidFill>
+              </a:rPr>
+              <a:t>No matter where I go</a:t>
+            </a:r>
+          </a:p>
+        </p:txBody>
+      </p:sp>
+      <p:sp>
+        <p:nvSpPr>
+          <p:cNvPr id="4" name="TextBox 3"/>
+          <p:cNvSpPr txBox="1"/>
+          <p:nvPr/>
+        </p:nvSpPr>
+        <p:spPr>
+          <a:xfrm>
+            <a:off x="8529729" y="0"/>
+            <a:ext cx="628698" cy="461665"/>
+          </a:xfrm>
+          <a:prstGeom prst="rect">
+            <a:avLst/>
+          </a:prstGeom>
+          <a:noFill/>
+        </p:spPr>
+        <p:txBody>
+          <a:bodyPr wrap="none" rtlCol="0">
+            <a:spAutoFit/>
+          </a:bodyPr>
+          <a:lstStyle/>
+          <a:p>
+            <a:r>
+              <a:rPr lang="en-GB" sz="2400" b="1" dirty="0">
+                <a:solidFill>
+                  <a:schemeClr val="bg1"/>
+                </a:solidFill>
+              </a:rPr>
+              <a:t>3/4</a:t>
+            </a:r>
+          </a:p>
+        </p:txBody>
+      </p:sp>
+    </p:spTree>
+    <p:extLst>
+      <p:ext uri="{BB962C8B-B14F-4D97-AF65-F5344CB8AC3E}">
+        <p14:creationId xmlns:p14="http://schemas.microsoft.com/office/powerpoint/2010/main" val="3955473016"/>
+      </p:ext>
+    </p:extLst>
+  </p:cSld>
+  <p:clrMapOvr>
+    <a:masterClrMapping/>
+  </p:clrMapOvr>
+</p:sld>
+</file>
+
+<file path=ppt/slides/slide43.xml><?xml version="1.0" encoding="utf-8"?>
+<p:sld xmlns:a="http://schemas.openxmlformats.org/drawingml/2006/main" xmlns:r="http://schemas.openxmlformats.org/officeDocument/2006/relationships" xmlns:p="http://schemas.openxmlformats.org/presentationml/2006/main">
+  <p:cSld>
+    <p:spTree>
+      <p:nvGrpSpPr>
+        <p:cNvPr id="1" name=""/>
+        <p:cNvGrpSpPr/>
+        <p:nvPr/>
+      </p:nvGrpSpPr>
+      <p:grpSpPr>
+        <a:xfrm>
+          <a:off x="0" y="0"/>
+          <a:ext cx="0" cy="0"/>
+          <a:chOff x="0" y="0"/>
+          <a:chExt cx="0" cy="0"/>
+        </a:xfrm>
+      </p:grpSpPr>
+      <p:sp>
+        <p:nvSpPr>
+          <p:cNvPr id="3" name="Subtitle 2"/>
+          <p:cNvSpPr>
+            <a:spLocks noGrp="1"/>
+          </p:cNvSpPr>
+          <p:nvPr>
+            <p:ph type="subTitle" idx="1"/>
+          </p:nvPr>
+        </p:nvSpPr>
+        <p:spPr>
+          <a:xfrm>
+            <a:off x="203118" y="692696"/>
+            <a:ext cx="8640960" cy="6480720"/>
+          </a:xfrm>
+        </p:spPr>
+        <p:txBody>
+          <a:bodyPr>
+            <a:noAutofit/>
+          </a:bodyPr>
+          <a:lstStyle/>
+          <a:p>
+            <a:r>
+              <a:rPr lang="en-GB" sz="3600" dirty="0">
+                <a:solidFill>
+                  <a:schemeClr val="bg1"/>
+                </a:solidFill>
+              </a:rPr>
+              <a:t>He knows my name</a:t>
+            </a:r>
+          </a:p>
+          <a:p>
+            <a:r>
+              <a:rPr lang="en-GB" sz="3600" dirty="0">
+                <a:solidFill>
+                  <a:schemeClr val="bg1"/>
+                </a:solidFill>
+              </a:rPr>
+              <a:t>He knows my every thought</a:t>
+            </a:r>
+          </a:p>
+          <a:p>
+            <a:r>
+              <a:rPr lang="en-GB" sz="3600" dirty="0">
+                <a:solidFill>
+                  <a:schemeClr val="bg1"/>
+                </a:solidFill>
+              </a:rPr>
+              <a:t>He sees each tear that falls</a:t>
+            </a:r>
+          </a:p>
+          <a:p>
+            <a:r>
+              <a:rPr lang="en-GB" sz="3600" dirty="0">
+                <a:solidFill>
+                  <a:schemeClr val="bg1"/>
+                </a:solidFill>
+              </a:rPr>
+              <a:t>And hears me when I call</a:t>
+            </a:r>
+          </a:p>
+        </p:txBody>
+      </p:sp>
+      <p:sp>
+        <p:nvSpPr>
+          <p:cNvPr id="4" name="TextBox 3"/>
+          <p:cNvSpPr txBox="1"/>
+          <p:nvPr/>
+        </p:nvSpPr>
+        <p:spPr>
+          <a:xfrm>
+            <a:off x="8529729" y="0"/>
+            <a:ext cx="628698" cy="461665"/>
+          </a:xfrm>
+          <a:prstGeom prst="rect">
+            <a:avLst/>
+          </a:prstGeom>
+          <a:noFill/>
+        </p:spPr>
+        <p:txBody>
+          <a:bodyPr wrap="none" rtlCol="0">
+            <a:spAutoFit/>
+          </a:bodyPr>
+          <a:lstStyle/>
+          <a:p>
+            <a:r>
+              <a:rPr lang="en-GB" sz="2400" b="1" dirty="0">
+                <a:solidFill>
+                  <a:schemeClr val="bg1"/>
+                </a:solidFill>
+              </a:rPr>
+              <a:t>4/4</a:t>
+            </a:r>
+          </a:p>
+        </p:txBody>
+      </p:sp>
+    </p:spTree>
+    <p:extLst>
+      <p:ext uri="{BB962C8B-B14F-4D97-AF65-F5344CB8AC3E}">
+        <p14:creationId xmlns:p14="http://schemas.microsoft.com/office/powerpoint/2010/main" val="1414847501"/>
+      </p:ext>
+    </p:extLst>
+  </p:cSld>
+  <p:clrMapOvr>
+    <a:masterClrMapping/>
+  </p:clrMapOvr>
+</p:sld>
+</file>
+
+<file path=ppt/slides/slide44.xml><?xml version="1.0" encoding="utf-8"?>
+<p:sld xmlns:a="http://schemas.openxmlformats.org/drawingml/2006/main" xmlns:r="http://schemas.openxmlformats.org/officeDocument/2006/relationships" xmlns:p="http://schemas.openxmlformats.org/presentationml/2006/main">
+  <p:cSld>
+    <p:spTree>
+      <p:nvGrpSpPr>
+        <p:cNvPr id="1" name=""/>
+        <p:cNvGrpSpPr/>
+        <p:nvPr/>
+      </p:nvGrpSpPr>
+      <p:grpSpPr>
+        <a:xfrm>
+          <a:off x="0" y="0"/>
+          <a:ext cx="0" cy="0"/>
+          <a:chOff x="0" y="0"/>
+          <a:chExt cx="0" cy="0"/>
+        </a:xfrm>
+      </p:grpSpPr>
+      <p:sp>
+        <p:nvSpPr>
+          <p:cNvPr id="2" name="Title 1">
+            <a:extLst>
+              <a:ext uri="{FF2B5EF4-FFF2-40B4-BE49-F238E27FC236}">
+                <a16:creationId xmlns:a16="http://schemas.microsoft.com/office/drawing/2014/main" id="{8D906D2A-5E68-F15C-89E4-2DBC4F4793A3}"/>
+              </a:ext>
+            </a:extLst>
+          </p:cNvPr>
+          <p:cNvSpPr txBox="1">
+            <a:spLocks/>
+          </p:cNvSpPr>
+          <p:nvPr/>
+        </p:nvSpPr>
+        <p:spPr bwMode="auto">
+          <a:xfrm>
+            <a:off x="457200" y="836712"/>
+            <a:ext cx="8229600" cy="489346"/>
+          </a:xfrm>
+          <a:prstGeom prst="rect">
+            <a:avLst/>
+          </a:prstGeom>
+          <a:noFill/>
+          <a:ln>
+            <a:noFill/>
+          </a:ln>
+          <a:extLst>
+            <a:ext uri="{909E8E84-426E-40DD-AFC4-6F175D3DCCD1}">
+              <a14:hiddenFill xmlns:a14="http://schemas.microsoft.com/office/drawing/2010/main">
+                <a:solidFill>
+                  <a:srgbClr val="FFFFFF"/>
+                </a:solidFill>
+              </a14:hiddenFill>
+            </a:ext>
+            <a:ext uri="{91240B29-F687-4F45-9708-019B960494DF}">
+              <a14:hiddenLine xmlns:a14="http://schemas.microsoft.com/office/drawing/2010/main" w="9525">
+                <a:solidFill>
+                  <a:srgbClr val="000000"/>
+                </a:solidFill>
+                <a:miter lim="800000"/>
+                <a:headEnd/>
+                <a:tailEnd/>
+              </a14:hiddenLine>
+            </a:ext>
+          </a:extLst>
+        </p:spPr>
+        <p:txBody>
+          <a:bodyPr vert="horz" wrap="square" lIns="91440" tIns="45720" rIns="91440" bIns="45720" numCol="1" anchor="ctr" anchorCtr="0" compatLnSpc="1">
+            <a:prstTxWarp prst="textNoShape">
+              <a:avLst/>
+            </a:prstTxWarp>
+            <a:normAutofit fontScale="90000" lnSpcReduction="10000"/>
+          </a:bodyPr>
+          <a:lstStyle>
+            <a:lvl1pPr algn="l" defTabSz="457200" rtl="0" eaLnBrk="1" fontAlgn="base" hangingPunct="1">
+              <a:spcBef>
+                <a:spcPct val="0"/>
+              </a:spcBef>
+              <a:spcAft>
+                <a:spcPct val="0"/>
+              </a:spcAft>
+              <a:defRPr sz="3200" kern="1200">
+                <a:solidFill>
+                  <a:srgbClr val="58595B"/>
+                </a:solidFill>
+                <a:latin typeface="Rockwell"/>
+                <a:ea typeface="+mj-ea"/>
+                <a:cs typeface="+mj-cs"/>
+              </a:defRPr>
+            </a:lvl1pPr>
+            <a:lvl2pPr algn="l" defTabSz="457200" rtl="0" eaLnBrk="1" fontAlgn="base" hangingPunct="1">
+              <a:spcBef>
+                <a:spcPct val="0"/>
+              </a:spcBef>
+              <a:spcAft>
+                <a:spcPct val="0"/>
+              </a:spcAft>
+              <a:defRPr sz="4400">
+                <a:solidFill>
+                  <a:srgbClr val="58595B"/>
+                </a:solidFill>
+                <a:latin typeface="Rockwell" panose="02060603020205020403" pitchFamily="18" charset="0"/>
+              </a:defRPr>
+            </a:lvl2pPr>
+            <a:lvl3pPr algn="l" defTabSz="457200" rtl="0" eaLnBrk="1" fontAlgn="base" hangingPunct="1">
+              <a:spcBef>
+                <a:spcPct val="0"/>
+              </a:spcBef>
+              <a:spcAft>
+                <a:spcPct val="0"/>
+              </a:spcAft>
+              <a:defRPr sz="4400">
+                <a:solidFill>
+                  <a:srgbClr val="58595B"/>
+                </a:solidFill>
+                <a:latin typeface="Rockwell" panose="02060603020205020403" pitchFamily="18" charset="0"/>
+              </a:defRPr>
+            </a:lvl3pPr>
+            <a:lvl4pPr algn="l" defTabSz="457200" rtl="0" eaLnBrk="1" fontAlgn="base" hangingPunct="1">
+              <a:spcBef>
+                <a:spcPct val="0"/>
+              </a:spcBef>
+              <a:spcAft>
+                <a:spcPct val="0"/>
+              </a:spcAft>
+              <a:defRPr sz="4400">
+                <a:solidFill>
+                  <a:srgbClr val="58595B"/>
+                </a:solidFill>
+                <a:latin typeface="Rockwell" panose="02060603020205020403" pitchFamily="18" charset="0"/>
+              </a:defRPr>
+            </a:lvl4pPr>
+            <a:lvl5pPr algn="l" defTabSz="457200" rtl="0" eaLnBrk="1" fontAlgn="base" hangingPunct="1">
+              <a:spcBef>
+                <a:spcPct val="0"/>
+              </a:spcBef>
+              <a:spcAft>
+                <a:spcPct val="0"/>
+              </a:spcAft>
+              <a:defRPr sz="4400">
+                <a:solidFill>
+                  <a:srgbClr val="58595B"/>
+                </a:solidFill>
+                <a:latin typeface="Rockwell" panose="02060603020205020403" pitchFamily="18" charset="0"/>
+              </a:defRPr>
+            </a:lvl5pPr>
+            <a:lvl6pPr marL="457200" algn="l" defTabSz="457200" rtl="0" eaLnBrk="1" fontAlgn="base" hangingPunct="1">
+              <a:spcBef>
+                <a:spcPct val="0"/>
+              </a:spcBef>
+              <a:spcAft>
+                <a:spcPct val="0"/>
+              </a:spcAft>
+              <a:defRPr sz="4400">
+                <a:solidFill>
+                  <a:srgbClr val="58595B"/>
+                </a:solidFill>
+                <a:latin typeface="Rockwell" panose="02060603020205020403" pitchFamily="18" charset="0"/>
+              </a:defRPr>
+            </a:lvl6pPr>
+            <a:lvl7pPr marL="914400" algn="l" defTabSz="457200" rtl="0" eaLnBrk="1" fontAlgn="base" hangingPunct="1">
+              <a:spcBef>
+                <a:spcPct val="0"/>
+              </a:spcBef>
+              <a:spcAft>
+                <a:spcPct val="0"/>
+              </a:spcAft>
+              <a:defRPr sz="4400">
+                <a:solidFill>
+                  <a:srgbClr val="58595B"/>
+                </a:solidFill>
+                <a:latin typeface="Rockwell" panose="02060603020205020403" pitchFamily="18" charset="0"/>
+              </a:defRPr>
+            </a:lvl7pPr>
+            <a:lvl8pPr marL="1371600" algn="l" defTabSz="457200" rtl="0" eaLnBrk="1" fontAlgn="base" hangingPunct="1">
+              <a:spcBef>
+                <a:spcPct val="0"/>
+              </a:spcBef>
+              <a:spcAft>
+                <a:spcPct val="0"/>
+              </a:spcAft>
+              <a:defRPr sz="4400">
+                <a:solidFill>
+                  <a:srgbClr val="58595B"/>
+                </a:solidFill>
+                <a:latin typeface="Rockwell" panose="02060603020205020403" pitchFamily="18" charset="0"/>
+              </a:defRPr>
+            </a:lvl8pPr>
+            <a:lvl9pPr marL="1828800" algn="l" defTabSz="457200" rtl="0" eaLnBrk="1" fontAlgn="base" hangingPunct="1">
+              <a:spcBef>
+                <a:spcPct val="0"/>
+              </a:spcBef>
+              <a:spcAft>
+                <a:spcPct val="0"/>
+              </a:spcAft>
+              <a:defRPr sz="4400">
+                <a:solidFill>
+                  <a:srgbClr val="58595B"/>
+                </a:solidFill>
+                <a:latin typeface="Rockwell" panose="02060603020205020403" pitchFamily="18" charset="0"/>
+              </a:defRPr>
+            </a:lvl9pPr>
+          </a:lstStyle>
+          <a:p>
+            <a:pPr marL="0" marR="0" lvl="0" indent="0" algn="l" defTabSz="457200" rtl="0" eaLnBrk="1" fontAlgn="base" latinLnBrk="0" hangingPunct="1">
+              <a:lnSpc>
+                <a:spcPct val="100000"/>
+              </a:lnSpc>
+              <a:spcBef>
+                <a:spcPct val="0"/>
+              </a:spcBef>
+              <a:spcAft>
+                <a:spcPct val="0"/>
+              </a:spcAft>
+              <a:buClrTx/>
+              <a:buSzTx/>
+              <a:buFontTx/>
+              <a:buNone/>
+              <a:tabLst/>
+              <a:defRPr/>
+            </a:pPr>
+            <a:endParaRPr kumimoji="0" lang="en-GB" sz="3200" b="0" i="0" u="none" strike="noStrike" kern="1200" cap="none" spc="0" normalizeH="0" baseline="0" noProof="0" dirty="0">
+              <a:ln>
+                <a:noFill/>
+              </a:ln>
+              <a:solidFill>
+                <a:schemeClr val="bg1"/>
+              </a:solidFill>
+              <a:effectLst/>
+              <a:uLnTx/>
+              <a:uFillTx/>
+              <a:latin typeface="Rockwell"/>
+              <a:ea typeface="+mj-ea"/>
+              <a:cs typeface="+mj-cs"/>
+            </a:endParaRPr>
+          </a:p>
+        </p:txBody>
+      </p:sp>
+      <p:sp>
+        <p:nvSpPr>
+          <p:cNvPr id="4" name="Title 1">
+            <a:extLst>
+              <a:ext uri="{FF2B5EF4-FFF2-40B4-BE49-F238E27FC236}">
+                <a16:creationId xmlns:a16="http://schemas.microsoft.com/office/drawing/2014/main" id="{89C6AC8B-4AF1-9B45-6683-F14ED4AE0E1F}"/>
+              </a:ext>
+            </a:extLst>
+          </p:cNvPr>
+          <p:cNvSpPr txBox="1">
+            <a:spLocks/>
+          </p:cNvSpPr>
+          <p:nvPr/>
+        </p:nvSpPr>
+        <p:spPr bwMode="auto">
+          <a:xfrm>
+            <a:off x="323528" y="116632"/>
+            <a:ext cx="8229600" cy="4680520"/>
+          </a:xfrm>
+          <a:prstGeom prst="rect">
+            <a:avLst/>
+          </a:prstGeom>
+          <a:noFill/>
+          <a:ln>
+            <a:noFill/>
+          </a:ln>
+          <a:extLst>
+            <a:ext uri="{909E8E84-426E-40DD-AFC4-6F175D3DCCD1}">
+              <a14:hiddenFill xmlns:a14="http://schemas.microsoft.com/office/drawing/2010/main">
+                <a:solidFill>
+                  <a:srgbClr val="FFFFFF"/>
+                </a:solidFill>
+              </a14:hiddenFill>
+            </a:ext>
+            <a:ext uri="{91240B29-F687-4F45-9708-019B960494DF}">
+              <a14:hiddenLine xmlns:a14="http://schemas.microsoft.com/office/drawing/2010/main" w="9525">
+                <a:solidFill>
+                  <a:srgbClr val="000000"/>
+                </a:solidFill>
+                <a:miter lim="800000"/>
+                <a:headEnd/>
+                <a:tailEnd/>
+              </a14:hiddenLine>
+            </a:ext>
+          </a:extLst>
+        </p:spPr>
+        <p:txBody>
+          <a:bodyPr vert="horz" wrap="square" lIns="91440" tIns="45720" rIns="91440" bIns="45720" numCol="1" anchor="ctr" anchorCtr="0" compatLnSpc="1">
+            <a:prstTxWarp prst="textNoShape">
+              <a:avLst/>
+            </a:prstTxWarp>
+            <a:normAutofit/>
+          </a:bodyPr>
+          <a:lstStyle>
+            <a:lvl1pPr algn="l" defTabSz="457200" rtl="0" eaLnBrk="1" fontAlgn="base" hangingPunct="1">
+              <a:spcBef>
+                <a:spcPct val="0"/>
+              </a:spcBef>
+              <a:spcAft>
+                <a:spcPct val="0"/>
+              </a:spcAft>
+              <a:defRPr sz="3200" kern="1200">
+                <a:solidFill>
+                  <a:srgbClr val="58595B"/>
+                </a:solidFill>
+                <a:latin typeface="Rockwell"/>
+                <a:ea typeface="+mj-ea"/>
+                <a:cs typeface="+mj-cs"/>
+              </a:defRPr>
+            </a:lvl1pPr>
+            <a:lvl2pPr algn="l" defTabSz="457200" rtl="0" eaLnBrk="1" fontAlgn="base" hangingPunct="1">
+              <a:spcBef>
+                <a:spcPct val="0"/>
+              </a:spcBef>
+              <a:spcAft>
+                <a:spcPct val="0"/>
+              </a:spcAft>
+              <a:defRPr sz="4400">
+                <a:solidFill>
+                  <a:srgbClr val="58595B"/>
+                </a:solidFill>
+                <a:latin typeface="Rockwell" panose="02060603020205020403" pitchFamily="18" charset="0"/>
+              </a:defRPr>
+            </a:lvl2pPr>
+            <a:lvl3pPr algn="l" defTabSz="457200" rtl="0" eaLnBrk="1" fontAlgn="base" hangingPunct="1">
+              <a:spcBef>
+                <a:spcPct val="0"/>
+              </a:spcBef>
+              <a:spcAft>
+                <a:spcPct val="0"/>
+              </a:spcAft>
+              <a:defRPr sz="4400">
+                <a:solidFill>
+                  <a:srgbClr val="58595B"/>
+                </a:solidFill>
+                <a:latin typeface="Rockwell" panose="02060603020205020403" pitchFamily="18" charset="0"/>
+              </a:defRPr>
+            </a:lvl3pPr>
+            <a:lvl4pPr algn="l" defTabSz="457200" rtl="0" eaLnBrk="1" fontAlgn="base" hangingPunct="1">
+              <a:spcBef>
+                <a:spcPct val="0"/>
+              </a:spcBef>
+              <a:spcAft>
+                <a:spcPct val="0"/>
+              </a:spcAft>
+              <a:defRPr sz="4400">
+                <a:solidFill>
+                  <a:srgbClr val="58595B"/>
+                </a:solidFill>
+                <a:latin typeface="Rockwell" panose="02060603020205020403" pitchFamily="18" charset="0"/>
+              </a:defRPr>
+            </a:lvl4pPr>
+            <a:lvl5pPr algn="l" defTabSz="457200" rtl="0" eaLnBrk="1" fontAlgn="base" hangingPunct="1">
+              <a:spcBef>
+                <a:spcPct val="0"/>
+              </a:spcBef>
+              <a:spcAft>
+                <a:spcPct val="0"/>
+              </a:spcAft>
+              <a:defRPr sz="4400">
+                <a:solidFill>
+                  <a:srgbClr val="58595B"/>
+                </a:solidFill>
+                <a:latin typeface="Rockwell" panose="02060603020205020403" pitchFamily="18" charset="0"/>
+              </a:defRPr>
+            </a:lvl5pPr>
+            <a:lvl6pPr marL="457200" algn="l" defTabSz="457200" rtl="0" eaLnBrk="1" fontAlgn="base" hangingPunct="1">
+              <a:spcBef>
+                <a:spcPct val="0"/>
+              </a:spcBef>
+              <a:spcAft>
+                <a:spcPct val="0"/>
+              </a:spcAft>
+              <a:defRPr sz="4400">
+                <a:solidFill>
+                  <a:srgbClr val="58595B"/>
+                </a:solidFill>
+                <a:latin typeface="Rockwell" panose="02060603020205020403" pitchFamily="18" charset="0"/>
+              </a:defRPr>
+            </a:lvl6pPr>
+            <a:lvl7pPr marL="914400" algn="l" defTabSz="457200" rtl="0" eaLnBrk="1" fontAlgn="base" hangingPunct="1">
+              <a:spcBef>
+                <a:spcPct val="0"/>
+              </a:spcBef>
+              <a:spcAft>
+                <a:spcPct val="0"/>
+              </a:spcAft>
+              <a:defRPr sz="4400">
+                <a:solidFill>
+                  <a:srgbClr val="58595B"/>
+                </a:solidFill>
+                <a:latin typeface="Rockwell" panose="02060603020205020403" pitchFamily="18" charset="0"/>
+              </a:defRPr>
+            </a:lvl7pPr>
+            <a:lvl8pPr marL="1371600" algn="l" defTabSz="457200" rtl="0" eaLnBrk="1" fontAlgn="base" hangingPunct="1">
+              <a:spcBef>
+                <a:spcPct val="0"/>
+              </a:spcBef>
+              <a:spcAft>
+                <a:spcPct val="0"/>
+              </a:spcAft>
+              <a:defRPr sz="4400">
+                <a:solidFill>
+                  <a:srgbClr val="58595B"/>
+                </a:solidFill>
+                <a:latin typeface="Rockwell" panose="02060603020205020403" pitchFamily="18" charset="0"/>
+              </a:defRPr>
+            </a:lvl8pPr>
+            <a:lvl9pPr marL="1828800" algn="l" defTabSz="457200" rtl="0" eaLnBrk="1" fontAlgn="base" hangingPunct="1">
+              <a:spcBef>
+                <a:spcPct val="0"/>
+              </a:spcBef>
+              <a:spcAft>
+                <a:spcPct val="0"/>
+              </a:spcAft>
+              <a:defRPr sz="4400">
+                <a:solidFill>
+                  <a:srgbClr val="58595B"/>
+                </a:solidFill>
+                <a:latin typeface="Rockwell" panose="02060603020205020403" pitchFamily="18" charset="0"/>
+              </a:defRPr>
+            </a:lvl9pPr>
+          </a:lstStyle>
+          <a:p>
+            <a:pPr lvl="0" algn="ctr">
+              <a:defRPr/>
+            </a:pPr>
+            <a:r>
+              <a:rPr lang="en-GB" dirty="0">
+                <a:solidFill>
+                  <a:schemeClr val="bg1"/>
+                </a:solidFill>
+              </a:rPr>
+              <a:t>2 Corinthians 14</a:t>
+            </a:r>
+            <a:br>
+              <a:rPr lang="en-GB" dirty="0">
+                <a:solidFill>
+                  <a:schemeClr val="bg1"/>
+                </a:solidFill>
+              </a:rPr>
+            </a:br>
+            <a:br>
+              <a:rPr lang="en-GB" dirty="0">
+                <a:solidFill>
+                  <a:schemeClr val="bg1"/>
+                </a:solidFill>
+              </a:rPr>
+            </a:br>
+            <a:r>
+              <a:rPr lang="en-GB" dirty="0">
+                <a:solidFill>
+                  <a:schemeClr val="bg1"/>
+                </a:solidFill>
+              </a:rPr>
+              <a:t>May the grace of the Lord Jesus Christ, and the love of God, and the fellowship of the Holy Spirit be with you all</a:t>
+            </a:r>
+          </a:p>
+        </p:txBody>
+      </p:sp>
+    </p:spTree>
+    <p:extLst>
+      <p:ext uri="{BB962C8B-B14F-4D97-AF65-F5344CB8AC3E}">
+        <p14:creationId xmlns:p14="http://schemas.microsoft.com/office/powerpoint/2010/main" val="3974712765"/>
       </p:ext>
     </p:extLst>
   </p:cSld>

</xml_diff>